<commit_message>
revised twitter demo and part of ppt two
</commit_message>
<xml_diff>
--- a/5_seminar/Contents_Part_01/Präsentation_Teil1.pptx
+++ b/5_seminar/Contents_Part_01/Präsentation_Teil1.pptx
@@ -144,7 +144,7 @@
   <p:extLst>
     <p:ext uri="{EFAFB233-063F-42B5-8137-9DF3F51BA10A}">
       <p15:sldGuideLst xmlns:p15="http://schemas.microsoft.com/office/powerpoint/2012/main">
-        <p15:guide id="1" orient="horz" pos="2160" userDrawn="1">
+        <p15:guide id="1" orient="horz" pos="2137" userDrawn="1">
           <p15:clr>
             <a:srgbClr val="A4A3A4"/>
           </p15:clr>
@@ -14353,7 +14353,7 @@
         </p:nvSpPr>
         <p:spPr>
           <a:xfrm>
-            <a:off x="2484540" y="5708252"/>
+            <a:off x="2018555" y="5708252"/>
             <a:ext cx="8640662" cy="461665"/>
           </a:xfrm>
           <a:prstGeom prst="rect">

</xml_diff>

<commit_message>
drafted demo text cleaning
</commit_message>
<xml_diff>
--- a/5_seminar/Contents_Part_01/Präsentation_Teil1.pptx
+++ b/5_seminar/Contents_Part_01/Präsentation_Teil1.pptx
@@ -242,7 +242,7 @@
           <a:p>
             <a:fld id="{7A5B87F2-13FD-4A24-9F19-39B31C60B536}" type="datetimeFigureOut">
               <a:rPr lang="en-US" smtClean="0"/>
-              <a:t>4/3/2021</a:t>
+              <a:t>4/10/2021</a:t>
             </a:fld>
             <a:endParaRPr lang="en-US"/>
           </a:p>
@@ -3682,7 +3682,7 @@
           <a:p>
             <a:fld id="{5A1811BA-6AD9-41A7-B7A2-456C8523519C}" type="datetime1">
               <a:rPr lang="en-US" smtClean="0"/>
-              <a:t>4/3/2021</a:t>
+              <a:t>4/10/2021</a:t>
             </a:fld>
             <a:endParaRPr lang="en-US"/>
           </a:p>
@@ -3852,7 +3852,7 @@
           <a:p>
             <a:fld id="{B0494441-C196-4BB0-93EE-AF22360207AB}" type="datetime1">
               <a:rPr lang="en-US" smtClean="0"/>
-              <a:t>4/3/2021</a:t>
+              <a:t>4/10/2021</a:t>
             </a:fld>
             <a:endParaRPr lang="en-US"/>
           </a:p>
@@ -4032,7 +4032,7 @@
           <a:p>
             <a:fld id="{D7B9282B-C3CE-4F56-8DD1-5349F982F1D2}" type="datetime1">
               <a:rPr lang="en-US" smtClean="0"/>
-              <a:t>4/3/2021</a:t>
+              <a:t>4/10/2021</a:t>
             </a:fld>
             <a:endParaRPr lang="en-US"/>
           </a:p>
@@ -4202,7 +4202,7 @@
           <a:p>
             <a:fld id="{E6E86D6A-786F-4E85-AF3B-385015383ABA}" type="datetime1">
               <a:rPr lang="en-US" smtClean="0"/>
-              <a:t>4/3/2021</a:t>
+              <a:t>4/10/2021</a:t>
             </a:fld>
             <a:endParaRPr lang="en-US"/>
           </a:p>
@@ -4448,7 +4448,7 @@
           <a:p>
             <a:fld id="{051FFEB0-9C80-4A34-A5C7-72D52D52FC7D}" type="datetime1">
               <a:rPr lang="en-US" smtClean="0"/>
-              <a:t>4/3/2021</a:t>
+              <a:t>4/10/2021</a:t>
             </a:fld>
             <a:endParaRPr lang="en-US"/>
           </a:p>
@@ -4680,7 +4680,7 @@
           <a:p>
             <a:fld id="{084267AD-C299-471B-ABA1-D0EA94C7EDCF}" type="datetime1">
               <a:rPr lang="en-US" smtClean="0"/>
-              <a:t>4/3/2021</a:t>
+              <a:t>4/10/2021</a:t>
             </a:fld>
             <a:endParaRPr lang="en-US"/>
           </a:p>
@@ -5047,7 +5047,7 @@
           <a:p>
             <a:fld id="{6468DBC7-10F8-46A1-8CE1-DBB0A6F0EF3E}" type="datetime1">
               <a:rPr lang="en-US" smtClean="0"/>
-              <a:t>4/3/2021</a:t>
+              <a:t>4/10/2021</a:t>
             </a:fld>
             <a:endParaRPr lang="en-US"/>
           </a:p>
@@ -5165,7 +5165,7 @@
           <a:p>
             <a:fld id="{0A97ED80-8DDA-43A7-A78F-B0542D691D0E}" type="datetime1">
               <a:rPr lang="en-US" smtClean="0"/>
-              <a:t>4/3/2021</a:t>
+              <a:t>4/10/2021</a:t>
             </a:fld>
             <a:endParaRPr lang="en-US"/>
           </a:p>
@@ -5260,7 +5260,7 @@
           <a:p>
             <a:fld id="{0AF827E6-45BA-40D2-98F2-BE4FFF095577}" type="datetime1">
               <a:rPr lang="en-US" smtClean="0"/>
-              <a:t>4/3/2021</a:t>
+              <a:t>4/10/2021</a:t>
             </a:fld>
             <a:endParaRPr lang="en-US"/>
           </a:p>
@@ -5537,7 +5537,7 @@
           <a:p>
             <a:fld id="{42BD114C-22EA-4B1A-A45B-ED6465C7BB4E}" type="datetime1">
               <a:rPr lang="en-US" smtClean="0"/>
-              <a:t>4/3/2021</a:t>
+              <a:t>4/10/2021</a:t>
             </a:fld>
             <a:endParaRPr lang="en-US"/>
           </a:p>
@@ -5790,7 +5790,7 @@
           <a:p>
             <a:fld id="{F46F8903-38BE-4FD8-98FC-E4EF771B2D8C}" type="datetime1">
               <a:rPr lang="en-US" smtClean="0"/>
-              <a:t>4/3/2021</a:t>
+              <a:t>4/10/2021</a:t>
             </a:fld>
             <a:endParaRPr lang="en-US"/>
           </a:p>
@@ -6003,7 +6003,7 @@
           <a:p>
             <a:fld id="{A91AC8C7-9CA9-4E83-8CE3-AD3BE4150B39}" type="datetime1">
               <a:rPr lang="en-US" smtClean="0"/>
-              <a:t>4/3/2021</a:t>
+              <a:t>4/10/2021</a:t>
             </a:fld>
             <a:endParaRPr lang="en-US"/>
           </a:p>
@@ -11817,7 +11817,7 @@
             </a:r>
             <a:r>
               <a:rPr lang="en-US"/>
-              <a:t>ombine topic extraction and sentiment analysis</a:t>
+              <a:t>ombine topic extraction (1) and sentiment analysis (2)</a:t>
             </a:r>
           </a:p>
           <a:p>
@@ -12163,9 +12163,9 @@
         <p:grpSpPr>
           <a:xfrm>
             <a:off x="1089868" y="2001663"/>
-            <a:ext cx="10355164" cy="724932"/>
+            <a:ext cx="10449920" cy="724932"/>
             <a:chOff x="1089868" y="2001663"/>
-            <a:chExt cx="10355164" cy="724932"/>
+            <a:chExt cx="10449920" cy="724932"/>
           </a:xfrm>
         </p:grpSpPr>
         <p:sp>
@@ -12554,8 +12554,8 @@
           </p:nvSpPr>
           <p:spPr>
             <a:xfrm>
-              <a:off x="7101670" y="2006587"/>
-              <a:ext cx="4343362" cy="720000"/>
+              <a:off x="7101669" y="2006587"/>
+              <a:ext cx="4438119" cy="720000"/>
             </a:xfrm>
             <a:prstGeom prst="homePlate">
               <a:avLst>
@@ -12628,7 +12628,7 @@
         <p:grpSpPr>
           <a:xfrm>
             <a:off x="719137" y="3702019"/>
-            <a:ext cx="10729912" cy="720016"/>
+            <a:ext cx="10820654" cy="720016"/>
             <a:chOff x="719137" y="3702019"/>
             <a:chExt cx="10729912" cy="720016"/>
           </a:xfrm>
@@ -12899,9 +12899,9 @@
         <p:grpSpPr>
           <a:xfrm>
             <a:off x="1099635" y="2854250"/>
-            <a:ext cx="10814422" cy="720074"/>
+            <a:ext cx="10841854" cy="720074"/>
             <a:chOff x="1085850" y="2854250"/>
-            <a:chExt cx="10814422" cy="720074"/>
+            <a:chExt cx="10841854" cy="720074"/>
           </a:xfrm>
         </p:grpSpPr>
         <p:sp>
@@ -12976,8 +12976,8 @@
           </p:nvSpPr>
           <p:spPr>
             <a:xfrm flipH="1">
-              <a:off x="5991222" y="2854324"/>
-              <a:ext cx="5453809" cy="720000"/>
+              <a:off x="5991221" y="2854324"/>
+              <a:ext cx="5516495" cy="720000"/>
             </a:xfrm>
             <a:prstGeom prst="homePlate">
               <a:avLst/>
@@ -13114,7 +13114,7 @@
           </p:nvSpPr>
           <p:spPr>
             <a:xfrm flipH="1">
-              <a:off x="11123978" y="2854250"/>
+              <a:off x="11151410" y="2854250"/>
               <a:ext cx="776294" cy="720000"/>
             </a:xfrm>
             <a:prstGeom prst="homePlate">
@@ -13516,7 +13516,7 @@
         </p:nvSpPr>
         <p:spPr>
           <a:xfrm flipH="1">
-            <a:off x="11156071" y="4549683"/>
+            <a:off x="11183503" y="4549683"/>
             <a:ext cx="776294" cy="720000"/>
           </a:xfrm>
           <a:prstGeom prst="homePlate">

</xml_diff>

<commit_message>
minor stuff, removed paths in demos
</commit_message>
<xml_diff>
--- a/5_seminar/Contents_Part_01/Präsentation_Teil1.pptx
+++ b/5_seminar/Contents_Part_01/Präsentation_Teil1.pptx
@@ -242,7 +242,7 @@
           <a:p>
             <a:fld id="{7A5B87F2-13FD-4A24-9F19-39B31C60B536}" type="datetimeFigureOut">
               <a:rPr lang="en-US" smtClean="0"/>
-              <a:t>4/10/2021</a:t>
+              <a:t>4/12/2021</a:t>
             </a:fld>
             <a:endParaRPr lang="en-US"/>
           </a:p>
@@ -3682,7 +3682,7 @@
           <a:p>
             <a:fld id="{5A1811BA-6AD9-41A7-B7A2-456C8523519C}" type="datetime1">
               <a:rPr lang="en-US" smtClean="0"/>
-              <a:t>4/10/2021</a:t>
+              <a:t>4/12/2021</a:t>
             </a:fld>
             <a:endParaRPr lang="en-US"/>
           </a:p>
@@ -3852,7 +3852,7 @@
           <a:p>
             <a:fld id="{B0494441-C196-4BB0-93EE-AF22360207AB}" type="datetime1">
               <a:rPr lang="en-US" smtClean="0"/>
-              <a:t>4/10/2021</a:t>
+              <a:t>4/12/2021</a:t>
             </a:fld>
             <a:endParaRPr lang="en-US"/>
           </a:p>
@@ -4032,7 +4032,7 @@
           <a:p>
             <a:fld id="{D7B9282B-C3CE-4F56-8DD1-5349F982F1D2}" type="datetime1">
               <a:rPr lang="en-US" smtClean="0"/>
-              <a:t>4/10/2021</a:t>
+              <a:t>4/12/2021</a:t>
             </a:fld>
             <a:endParaRPr lang="en-US"/>
           </a:p>
@@ -4202,7 +4202,7 @@
           <a:p>
             <a:fld id="{E6E86D6A-786F-4E85-AF3B-385015383ABA}" type="datetime1">
               <a:rPr lang="en-US" smtClean="0"/>
-              <a:t>4/10/2021</a:t>
+              <a:t>4/12/2021</a:t>
             </a:fld>
             <a:endParaRPr lang="en-US"/>
           </a:p>
@@ -4448,7 +4448,7 @@
           <a:p>
             <a:fld id="{051FFEB0-9C80-4A34-A5C7-72D52D52FC7D}" type="datetime1">
               <a:rPr lang="en-US" smtClean="0"/>
-              <a:t>4/10/2021</a:t>
+              <a:t>4/12/2021</a:t>
             </a:fld>
             <a:endParaRPr lang="en-US"/>
           </a:p>
@@ -4680,7 +4680,7 @@
           <a:p>
             <a:fld id="{084267AD-C299-471B-ABA1-D0EA94C7EDCF}" type="datetime1">
               <a:rPr lang="en-US" smtClean="0"/>
-              <a:t>4/10/2021</a:t>
+              <a:t>4/12/2021</a:t>
             </a:fld>
             <a:endParaRPr lang="en-US"/>
           </a:p>
@@ -5047,7 +5047,7 @@
           <a:p>
             <a:fld id="{6468DBC7-10F8-46A1-8CE1-DBB0A6F0EF3E}" type="datetime1">
               <a:rPr lang="en-US" smtClean="0"/>
-              <a:t>4/10/2021</a:t>
+              <a:t>4/12/2021</a:t>
             </a:fld>
             <a:endParaRPr lang="en-US"/>
           </a:p>
@@ -5165,7 +5165,7 @@
           <a:p>
             <a:fld id="{0A97ED80-8DDA-43A7-A78F-B0542D691D0E}" type="datetime1">
               <a:rPr lang="en-US" smtClean="0"/>
-              <a:t>4/10/2021</a:t>
+              <a:t>4/12/2021</a:t>
             </a:fld>
             <a:endParaRPr lang="en-US"/>
           </a:p>
@@ -5260,7 +5260,7 @@
           <a:p>
             <a:fld id="{0AF827E6-45BA-40D2-98F2-BE4FFF095577}" type="datetime1">
               <a:rPr lang="en-US" smtClean="0"/>
-              <a:t>4/10/2021</a:t>
+              <a:t>4/12/2021</a:t>
             </a:fld>
             <a:endParaRPr lang="en-US"/>
           </a:p>
@@ -5537,7 +5537,7 @@
           <a:p>
             <a:fld id="{42BD114C-22EA-4B1A-A45B-ED6465C7BB4E}" type="datetime1">
               <a:rPr lang="en-US" smtClean="0"/>
-              <a:t>4/10/2021</a:t>
+              <a:t>4/12/2021</a:t>
             </a:fld>
             <a:endParaRPr lang="en-US"/>
           </a:p>
@@ -5790,7 +5790,7 @@
           <a:p>
             <a:fld id="{F46F8903-38BE-4FD8-98FC-E4EF771B2D8C}" type="datetime1">
               <a:rPr lang="en-US" smtClean="0"/>
-              <a:t>4/10/2021</a:t>
+              <a:t>4/12/2021</a:t>
             </a:fld>
             <a:endParaRPr lang="en-US"/>
           </a:p>
@@ -6003,7 +6003,7 @@
           <a:p>
             <a:fld id="{A91AC8C7-9CA9-4E83-8CE3-AD3BE4150B39}" type="datetime1">
               <a:rPr lang="en-US" smtClean="0"/>
-              <a:t>4/10/2021</a:t>
+              <a:t>4/12/2021</a:t>
             </a:fld>
             <a:endParaRPr lang="en-US"/>
           </a:p>
@@ -8785,14 +8785,14 @@
           <p:nvPr>
             <p:extLst>
               <p:ext uri="{D42A27DB-BD31-4B8C-83A1-F6EECF244321}">
-                <p14:modId xmlns:p14="http://schemas.microsoft.com/office/powerpoint/2010/main" val="2342021060"/>
+                <p14:modId xmlns:p14="http://schemas.microsoft.com/office/powerpoint/2010/main" val="2729130515"/>
               </p:ext>
             </p:extLst>
           </p:nvPr>
         </p:nvGraphicFramePr>
         <p:xfrm>
           <a:off x="1066799" y="1990724"/>
-          <a:ext cx="10286999" cy="4358640"/>
+          <a:ext cx="10286999" cy="4267200"/>
         </p:xfrm>
         <a:graphic>
           <a:graphicData uri="http://schemas.openxmlformats.org/drawingml/2006/table">
@@ -8823,17 +8823,17 @@
                   </a:extLst>
                 </a:gridCol>
               </a:tblGrid>
-              <a:tr h="326881">
+              <a:tr h="259488">
                 <a:tc>
                   <a:txBody>
                     <a:bodyPr/>
                     <a:lstStyle/>
                     <a:p>
                       <a:r>
-                        <a:rPr lang="de-DE" sz="1600" b="1"/>
+                        <a:rPr lang="de-DE" sz="1400" b="1"/>
                         <a:t>Variable</a:t>
                       </a:r>
-                      <a:endParaRPr lang="en-US" sz="1600" b="1"/>
+                      <a:endParaRPr lang="en-US" sz="1400" b="1"/>
                     </a:p>
                   </a:txBody>
                   <a:tcPr/>
@@ -8844,10 +8844,10 @@
                     <a:lstStyle/>
                     <a:p>
                       <a:r>
-                        <a:rPr lang="de-DE" sz="1600" b="1"/>
+                        <a:rPr lang="de-DE" sz="1400" b="1"/>
                         <a:t>Type</a:t>
                       </a:r>
-                      <a:endParaRPr lang="en-US" sz="1600" b="1"/>
+                      <a:endParaRPr lang="en-US" sz="1400" b="1"/>
                     </a:p>
                   </a:txBody>
                   <a:tcPr/>
@@ -8858,10 +8858,10 @@
                     <a:lstStyle/>
                     <a:p>
                       <a:r>
-                        <a:rPr lang="de-DE" sz="1600" b="1"/>
+                        <a:rPr lang="de-DE" sz="1400" b="1"/>
                         <a:t>Description</a:t>
                       </a:r>
-                      <a:endParaRPr lang="en-US" sz="1600" b="1"/>
+                      <a:endParaRPr lang="en-US" sz="1400" b="1"/>
                     </a:p>
                   </a:txBody>
                   <a:tcPr/>
@@ -8872,19 +8872,19 @@
                   </a:ext>
                 </a:extLst>
               </a:tr>
-              <a:tr h="331573">
+              <a:tr h="259488">
                 <a:tc>
                   <a:txBody>
                     <a:bodyPr/>
                     <a:lstStyle/>
                     <a:p>
                       <a:r>
-                        <a:rPr lang="de-DE" sz="1600">
+                        <a:rPr lang="de-DE" sz="1400">
                           <a:latin typeface="Consolas" panose="020B0609020204030204" pitchFamily="49" charset="0"/>
                         </a:rPr>
                         <a:t>last_name</a:t>
                       </a:r>
-                      <a:endParaRPr lang="en-US" sz="1600">
+                      <a:endParaRPr lang="en-US" sz="1400">
                         <a:latin typeface="Consolas" panose="020B0609020204030204" pitchFamily="49" charset="0"/>
                       </a:endParaRPr>
                     </a:p>
@@ -8897,12 +8897,12 @@
                     <a:lstStyle/>
                     <a:p>
                       <a:r>
-                        <a:rPr lang="de-DE" sz="1600">
+                        <a:rPr lang="de-DE" sz="1400">
                           <a:latin typeface="Consolas" panose="020B0609020204030204" pitchFamily="49" charset="0"/>
                         </a:rPr>
                         <a:t>chr</a:t>
                       </a:r>
-                      <a:endParaRPr lang="en-US" sz="1600">
+                      <a:endParaRPr lang="en-US" sz="1400">
                         <a:latin typeface="Consolas" panose="020B0609020204030204" pitchFamily="49" charset="0"/>
                       </a:endParaRPr>
                     </a:p>
@@ -8915,10 +8915,10 @@
                     <a:lstStyle/>
                     <a:p>
                       <a:r>
-                        <a:rPr lang="de-DE" sz="1600"/>
+                        <a:rPr lang="de-DE" sz="1400"/>
                         <a:t>MP‘s last name</a:t>
                       </a:r>
-                      <a:endParaRPr lang="en-US" sz="1600"/>
+                      <a:endParaRPr lang="en-US" sz="1400"/>
                     </a:p>
                   </a:txBody>
                   <a:tcPr/>
@@ -8929,19 +8929,19 @@
                   </a:ext>
                 </a:extLst>
               </a:tr>
-              <a:tr h="331573">
+              <a:tr h="259488">
                 <a:tc>
                   <a:txBody>
                     <a:bodyPr/>
                     <a:lstStyle/>
                     <a:p>
                       <a:r>
-                        <a:rPr lang="de-DE" sz="1600">
+                        <a:rPr lang="de-DE" sz="1400">
                           <a:latin typeface="Consolas" panose="020B0609020204030204" pitchFamily="49" charset="0"/>
                         </a:rPr>
                         <a:t>first_name</a:t>
                       </a:r>
-                      <a:endParaRPr lang="en-US" sz="1600">
+                      <a:endParaRPr lang="en-US" sz="1400">
                         <a:latin typeface="Consolas" panose="020B0609020204030204" pitchFamily="49" charset="0"/>
                       </a:endParaRPr>
                     </a:p>
@@ -8954,12 +8954,12 @@
                     <a:lstStyle/>
                     <a:p>
                       <a:r>
-                        <a:rPr lang="de-DE" sz="1600">
+                        <a:rPr lang="de-DE" sz="1400">
                           <a:latin typeface="Consolas" panose="020B0609020204030204" pitchFamily="49" charset="0"/>
                         </a:rPr>
                         <a:t>chr</a:t>
                       </a:r>
-                      <a:endParaRPr lang="en-US" sz="1600">
+                      <a:endParaRPr lang="en-US" sz="1400">
                         <a:latin typeface="Consolas" panose="020B0609020204030204" pitchFamily="49" charset="0"/>
                       </a:endParaRPr>
                     </a:p>
@@ -8972,10 +8972,10 @@
                     <a:lstStyle/>
                     <a:p>
                       <a:r>
-                        <a:rPr lang="de-DE" sz="1600"/>
+                        <a:rPr lang="de-DE" sz="1400"/>
                         <a:t>MP‘s first name</a:t>
                       </a:r>
-                      <a:endParaRPr lang="en-US" sz="1600"/>
+                      <a:endParaRPr lang="en-US" sz="1400"/>
                     </a:p>
                   </a:txBody>
                   <a:tcPr/>
@@ -8986,19 +8986,19 @@
                   </a:ext>
                 </a:extLst>
               </a:tr>
-              <a:tr h="331573">
+              <a:tr h="259488">
                 <a:tc>
                   <a:txBody>
                     <a:bodyPr/>
                     <a:lstStyle/>
                     <a:p>
                       <a:r>
-                        <a:rPr lang="de-DE" sz="1600">
+                        <a:rPr lang="de-DE" sz="1400">
                           <a:latin typeface="Consolas" panose="020B0609020204030204" pitchFamily="49" charset="0"/>
                         </a:rPr>
-                        <a:t>party</a:t>
+                        <a:t>wahlkreis_name</a:t>
                       </a:r>
-                      <a:endParaRPr lang="en-US" sz="1600">
+                      <a:endParaRPr lang="en-US" sz="1400">
                         <a:latin typeface="Consolas" panose="020B0609020204030204" pitchFamily="49" charset="0"/>
                       </a:endParaRPr>
                     </a:p>
@@ -9011,12 +9011,12 @@
                     <a:lstStyle/>
                     <a:p>
                       <a:r>
-                        <a:rPr lang="de-DE" sz="1600">
+                        <a:rPr lang="de-DE" sz="1400">
                           <a:latin typeface="Consolas" panose="020B0609020204030204" pitchFamily="49" charset="0"/>
                         </a:rPr>
-                        <a:t>factor</a:t>
+                        <a:t>chr</a:t>
                       </a:r>
-                      <a:endParaRPr lang="en-US" sz="1600">
+                      <a:endParaRPr lang="en-US" sz="1400">
                         <a:latin typeface="Consolas" panose="020B0609020204030204" pitchFamily="49" charset="0"/>
                       </a:endParaRPr>
                     </a:p>
@@ -9029,33 +9029,33 @@
                     <a:lstStyle/>
                     <a:p>
                       <a:r>
-                        <a:rPr lang="de-DE" sz="1600"/>
-                        <a:t>MP‘s political part</a:t>
+                        <a:rPr lang="de-DE" sz="1400"/>
+                        <a:t>MP‘s electoral district</a:t>
                       </a:r>
-                      <a:endParaRPr lang="en-US" sz="1600"/>
+                      <a:endParaRPr lang="en-US" sz="1400"/>
                     </a:p>
                   </a:txBody>
                   <a:tcPr/>
                 </a:tc>
                 <a:extLst>
                   <a:ext uri="{0D108BD9-81ED-4DB2-BD59-A6C34878D82A}">
-                    <a16:rowId xmlns:a16="http://schemas.microsoft.com/office/drawing/2014/main" val="3743779192"/>
+                    <a16:rowId xmlns:a16="http://schemas.microsoft.com/office/drawing/2014/main" val="3777663055"/>
                   </a:ext>
                 </a:extLst>
               </a:tr>
-              <a:tr h="331573">
+              <a:tr h="259488">
                 <a:tc>
                   <a:txBody>
                     <a:bodyPr/>
                     <a:lstStyle/>
                     <a:p>
                       <a:r>
-                        <a:rPr lang="de-DE" sz="1600">
+                        <a:rPr lang="de-DE" sz="1400">
                           <a:latin typeface="Consolas" panose="020B0609020204030204" pitchFamily="49" charset="0"/>
                         </a:rPr>
-                        <a:t>bundesland</a:t>
+                        <a:t>party</a:t>
                       </a:r>
-                      <a:endParaRPr lang="en-US" sz="1600">
+                      <a:endParaRPr lang="en-US" sz="1400">
                         <a:latin typeface="Consolas" panose="020B0609020204030204" pitchFamily="49" charset="0"/>
                       </a:endParaRPr>
                     </a:p>
@@ -9068,12 +9068,12 @@
                     <a:lstStyle/>
                     <a:p>
                       <a:r>
-                        <a:rPr lang="de-DE" sz="1600">
+                        <a:rPr lang="de-DE" sz="1400">
                           <a:latin typeface="Consolas" panose="020B0609020204030204" pitchFamily="49" charset="0"/>
                         </a:rPr>
                         <a:t>factor</a:t>
                       </a:r>
-                      <a:endParaRPr lang="en-US" sz="1600">
+                      <a:endParaRPr lang="en-US" sz="1400">
                         <a:latin typeface="Consolas" panose="020B0609020204030204" pitchFamily="49" charset="0"/>
                       </a:endParaRPr>
                     </a:p>
@@ -9086,33 +9086,33 @@
                     <a:lstStyle/>
                     <a:p>
                       <a:r>
-                        <a:rPr lang="de-DE" sz="1600"/>
-                        <a:t>Federal state of MP‘s electoral district</a:t>
+                        <a:rPr lang="de-DE" sz="1400"/>
+                        <a:t>MP‘s political party</a:t>
                       </a:r>
-                      <a:endParaRPr lang="en-US" sz="1600"/>
+                      <a:endParaRPr lang="en-US" sz="1400"/>
                     </a:p>
                   </a:txBody>
                   <a:tcPr/>
                 </a:tc>
                 <a:extLst>
                   <a:ext uri="{0D108BD9-81ED-4DB2-BD59-A6C34878D82A}">
-                    <a16:rowId xmlns:a16="http://schemas.microsoft.com/office/drawing/2014/main" val="2586419261"/>
+                    <a16:rowId xmlns:a16="http://schemas.microsoft.com/office/drawing/2014/main" val="3743779192"/>
                   </a:ext>
                 </a:extLst>
               </a:tr>
-              <a:tr h="331573">
+              <a:tr h="259488">
                 <a:tc>
                   <a:txBody>
                     <a:bodyPr/>
                     <a:lstStyle/>
                     <a:p>
                       <a:r>
-                        <a:rPr lang="de-DE" sz="1600">
+                        <a:rPr lang="de-DE" sz="1400">
                           <a:latin typeface="Consolas" panose="020B0609020204030204" pitchFamily="49" charset="0"/>
                         </a:rPr>
-                        <a:t>unemployment_rate</a:t>
+                        <a:t>bundesland</a:t>
                       </a:r>
-                      <a:endParaRPr lang="en-US" sz="1600">
+                      <a:endParaRPr lang="en-US" sz="1400">
                         <a:latin typeface="Consolas" panose="020B0609020204030204" pitchFamily="49" charset="0"/>
                       </a:endParaRPr>
                     </a:p>
@@ -9125,12 +9125,12 @@
                     <a:lstStyle/>
                     <a:p>
                       <a:r>
-                        <a:rPr lang="de-DE" sz="1600">
+                        <a:rPr lang="de-DE" sz="1400">
                           <a:latin typeface="Consolas" panose="020B0609020204030204" pitchFamily="49" charset="0"/>
                         </a:rPr>
-                        <a:t>num</a:t>
+                        <a:t>factor</a:t>
                       </a:r>
-                      <a:endParaRPr lang="en-US" sz="1600">
+                      <a:endParaRPr lang="en-US" sz="1400">
                         <a:latin typeface="Consolas" panose="020B0609020204030204" pitchFamily="49" charset="0"/>
                       </a:endParaRPr>
                     </a:p>
@@ -9143,33 +9143,33 @@
                     <a:lstStyle/>
                     <a:p>
                       <a:r>
-                        <a:rPr lang="de-DE" sz="1600"/>
-                        <a:t>Unemployment rate in MP‘s electoral district during 2017 election</a:t>
+                        <a:rPr lang="de-DE" sz="1400"/>
+                        <a:t>Federal state of MP‘s electoral district</a:t>
                       </a:r>
-                      <a:endParaRPr lang="en-US" sz="1600"/>
+                      <a:endParaRPr lang="en-US" sz="1400"/>
                     </a:p>
                   </a:txBody>
                   <a:tcPr/>
                 </a:tc>
                 <a:extLst>
                   <a:ext uri="{0D108BD9-81ED-4DB2-BD59-A6C34878D82A}">
-                    <a16:rowId xmlns:a16="http://schemas.microsoft.com/office/drawing/2014/main" val="2834735668"/>
+                    <a16:rowId xmlns:a16="http://schemas.microsoft.com/office/drawing/2014/main" val="2586419261"/>
                   </a:ext>
                 </a:extLst>
               </a:tr>
-              <a:tr h="331573">
+              <a:tr h="259488">
                 <a:tc>
                   <a:txBody>
                     <a:bodyPr/>
                     <a:lstStyle/>
                     <a:p>
                       <a:r>
-                        <a:rPr lang="de-DE" sz="1600">
+                        <a:rPr lang="de-DE" sz="1400">
                           <a:latin typeface="Consolas" panose="020B0609020204030204" pitchFamily="49" charset="0"/>
                         </a:rPr>
-                        <a:t>user_name</a:t>
+                        <a:t>unemployment_rate</a:t>
                       </a:r>
-                      <a:endParaRPr lang="en-US" sz="1600">
+                      <a:endParaRPr lang="en-US" sz="1400">
                         <a:latin typeface="Consolas" panose="020B0609020204030204" pitchFamily="49" charset="0"/>
                       </a:endParaRPr>
                     </a:p>
@@ -9182,12 +9182,12 @@
                     <a:lstStyle/>
                     <a:p>
                       <a:r>
-                        <a:rPr lang="de-DE" sz="1600">
+                        <a:rPr lang="de-DE" sz="1400">
                           <a:latin typeface="Consolas" panose="020B0609020204030204" pitchFamily="49" charset="0"/>
                         </a:rPr>
-                        <a:t>chr</a:t>
+                        <a:t>num</a:t>
                       </a:r>
-                      <a:endParaRPr lang="en-US" sz="1600">
+                      <a:endParaRPr lang="en-US" sz="1400">
                         <a:latin typeface="Consolas" panose="020B0609020204030204" pitchFamily="49" charset="0"/>
                       </a:endParaRPr>
                     </a:p>
@@ -9200,33 +9200,33 @@
                     <a:lstStyle/>
                     <a:p>
                       <a:r>
-                        <a:rPr lang="de-DE" sz="1600"/>
-                        <a:t>MP‘s username on Twitter</a:t>
+                        <a:rPr lang="de-DE" sz="1400"/>
+                        <a:t>Unemployment rate in MP‘s electoral district during 2017 election</a:t>
                       </a:r>
-                      <a:endParaRPr lang="en-US" sz="1600"/>
+                      <a:endParaRPr lang="en-US" sz="1400"/>
                     </a:p>
                   </a:txBody>
                   <a:tcPr/>
                 </a:tc>
                 <a:extLst>
                   <a:ext uri="{0D108BD9-81ED-4DB2-BD59-A6C34878D82A}">
-                    <a16:rowId xmlns:a16="http://schemas.microsoft.com/office/drawing/2014/main" val="3169794567"/>
+                    <a16:rowId xmlns:a16="http://schemas.microsoft.com/office/drawing/2014/main" val="2834735668"/>
                   </a:ext>
                 </a:extLst>
               </a:tr>
-              <a:tr h="331573">
+              <a:tr h="259488">
                 <a:tc>
                   <a:txBody>
                     <a:bodyPr/>
                     <a:lstStyle/>
                     <a:p>
                       <a:r>
-                        <a:rPr lang="de-DE" sz="1600">
+                        <a:rPr lang="de-DE" sz="1400">
                           <a:latin typeface="Consolas" panose="020B0609020204030204" pitchFamily="49" charset="0"/>
                         </a:rPr>
-                        <a:t>followers_count</a:t>
+                        <a:t>share_pop_migration</a:t>
                       </a:r>
-                      <a:endParaRPr lang="en-US" sz="1600">
+                      <a:endParaRPr lang="en-US" sz="1400">
                         <a:latin typeface="Consolas" panose="020B0609020204030204" pitchFamily="49" charset="0"/>
                       </a:endParaRPr>
                     </a:p>
@@ -9239,12 +9239,12 @@
                     <a:lstStyle/>
                     <a:p>
                       <a:r>
-                        <a:rPr lang="de-DE" sz="1600">
+                        <a:rPr lang="de-DE" sz="1400">
                           <a:latin typeface="Consolas" panose="020B0609020204030204" pitchFamily="49" charset="0"/>
                         </a:rPr>
                         <a:t>num</a:t>
                       </a:r>
-                      <a:endParaRPr lang="en-US" sz="1600">
+                      <a:endParaRPr lang="en-US" sz="1400">
                         <a:latin typeface="Consolas" panose="020B0609020204030204" pitchFamily="49" charset="0"/>
                       </a:endParaRPr>
                     </a:p>
@@ -9257,33 +9257,33 @@
                     <a:lstStyle/>
                     <a:p>
                       <a:r>
-                        <a:rPr lang="de-DE" sz="1600"/>
-                        <a:t>MP‘s number of followers on Twitter at scraping time</a:t>
+                        <a:rPr lang="de-DE" sz="1400"/>
+                        <a:t>Share of migrant population in MP‘s electoral district during 2017 election </a:t>
                       </a:r>
-                      <a:endParaRPr lang="en-US" sz="1600"/>
+                      <a:endParaRPr lang="en-US" sz="1400"/>
                     </a:p>
                   </a:txBody>
                   <a:tcPr/>
                 </a:tc>
                 <a:extLst>
                   <a:ext uri="{0D108BD9-81ED-4DB2-BD59-A6C34878D82A}">
-                    <a16:rowId xmlns:a16="http://schemas.microsoft.com/office/drawing/2014/main" val="3546383149"/>
+                    <a16:rowId xmlns:a16="http://schemas.microsoft.com/office/drawing/2014/main" val="3214618036"/>
                   </a:ext>
                 </a:extLst>
               </a:tr>
-              <a:tr h="331573">
+              <a:tr h="259488">
                 <a:tc>
                   <a:txBody>
                     <a:bodyPr/>
                     <a:lstStyle/>
                     <a:p>
                       <a:r>
-                        <a:rPr lang="de-DE" sz="1600">
+                        <a:rPr lang="de-DE" sz="1400">
                           <a:latin typeface="Consolas" panose="020B0609020204030204" pitchFamily="49" charset="0"/>
                         </a:rPr>
-                        <a:t>created_at</a:t>
+                        <a:t>user_name</a:t>
                       </a:r>
-                      <a:endParaRPr lang="en-US" sz="1600">
+                      <a:endParaRPr lang="en-US" sz="1400">
                         <a:latin typeface="Consolas" panose="020B0609020204030204" pitchFamily="49" charset="0"/>
                       </a:endParaRPr>
                     </a:p>
@@ -9296,12 +9296,12 @@
                     <a:lstStyle/>
                     <a:p>
                       <a:r>
-                        <a:rPr lang="de-DE" sz="1600">
+                        <a:rPr lang="de-DE" sz="1400">
                           <a:latin typeface="Consolas" panose="020B0609020204030204" pitchFamily="49" charset="0"/>
                         </a:rPr>
-                        <a:t>date</a:t>
+                        <a:t>chr</a:t>
                       </a:r>
-                      <a:endParaRPr lang="en-US" sz="1600">
+                      <a:endParaRPr lang="en-US" sz="1400">
                         <a:latin typeface="Consolas" panose="020B0609020204030204" pitchFamily="49" charset="0"/>
                       </a:endParaRPr>
                     </a:p>
@@ -9314,33 +9314,33 @@
                     <a:lstStyle/>
                     <a:p>
                       <a:r>
-                        <a:rPr lang="de-DE" sz="1600"/>
-                        <a:t>Time stamp of tweet creation</a:t>
+                        <a:rPr lang="de-DE" sz="1400"/>
+                        <a:t>MP‘s username on Twitter</a:t>
                       </a:r>
-                      <a:endParaRPr lang="en-US" sz="1600"/>
+                      <a:endParaRPr lang="en-US" sz="1400"/>
                     </a:p>
                   </a:txBody>
                   <a:tcPr/>
                 </a:tc>
                 <a:extLst>
                   <a:ext uri="{0D108BD9-81ED-4DB2-BD59-A6C34878D82A}">
-                    <a16:rowId xmlns:a16="http://schemas.microsoft.com/office/drawing/2014/main" val="3588617551"/>
+                    <a16:rowId xmlns:a16="http://schemas.microsoft.com/office/drawing/2014/main" val="3169794567"/>
                   </a:ext>
                 </a:extLst>
               </a:tr>
-              <a:tr h="331573">
+              <a:tr h="259488">
                 <a:tc>
                   <a:txBody>
                     <a:bodyPr/>
                     <a:lstStyle/>
                     <a:p>
                       <a:r>
-                        <a:rPr lang="de-DE" sz="1600">
+                        <a:rPr lang="de-DE" sz="1400">
                           <a:latin typeface="Consolas" panose="020B0609020204030204" pitchFamily="49" charset="0"/>
                         </a:rPr>
-                        <a:t>location</a:t>
+                        <a:t>followers_count</a:t>
                       </a:r>
-                      <a:endParaRPr lang="en-US" sz="1600">
+                      <a:endParaRPr lang="en-US" sz="1400">
                         <a:latin typeface="Consolas" panose="020B0609020204030204" pitchFamily="49" charset="0"/>
                       </a:endParaRPr>
                     </a:p>
@@ -9353,12 +9353,12 @@
                     <a:lstStyle/>
                     <a:p>
                       <a:r>
-                        <a:rPr lang="de-DE" sz="1600">
+                        <a:rPr lang="de-DE" sz="1400">
                           <a:latin typeface="Consolas" panose="020B0609020204030204" pitchFamily="49" charset="0"/>
                         </a:rPr>
-                        <a:t>chr</a:t>
+                        <a:t>num</a:t>
                       </a:r>
-                      <a:endParaRPr lang="en-US" sz="1600">
+                      <a:endParaRPr lang="en-US" sz="1400">
                         <a:latin typeface="Consolas" panose="020B0609020204030204" pitchFamily="49" charset="0"/>
                       </a:endParaRPr>
                     </a:p>
@@ -9371,33 +9371,33 @@
                     <a:lstStyle/>
                     <a:p>
                       <a:r>
-                        <a:rPr lang="de-DE" sz="1600"/>
-                        <a:t>Location of tweet creation</a:t>
+                        <a:rPr lang="de-DE" sz="1400"/>
+                        <a:t>MP‘s number of followers on Twitter at scraping time</a:t>
                       </a:r>
-                      <a:endParaRPr lang="en-US" sz="1600"/>
+                      <a:endParaRPr lang="en-US" sz="1400"/>
                     </a:p>
                   </a:txBody>
                   <a:tcPr/>
                 </a:tc>
                 <a:extLst>
                   <a:ext uri="{0D108BD9-81ED-4DB2-BD59-A6C34878D82A}">
-                    <a16:rowId xmlns:a16="http://schemas.microsoft.com/office/drawing/2014/main" val="3823518672"/>
+                    <a16:rowId xmlns:a16="http://schemas.microsoft.com/office/drawing/2014/main" val="3546383149"/>
                   </a:ext>
                 </a:extLst>
               </a:tr>
-              <a:tr h="331573">
+              <a:tr h="259488">
                 <a:tc>
                   <a:txBody>
                     <a:bodyPr/>
                     <a:lstStyle/>
                     <a:p>
                       <a:r>
-                        <a:rPr lang="de-DE" sz="1600">
+                        <a:rPr lang="de-DE" sz="1400">
                           <a:latin typeface="Consolas" panose="020B0609020204030204" pitchFamily="49" charset="0"/>
                         </a:rPr>
-                        <a:t>text</a:t>
+                        <a:t>created_at</a:t>
                       </a:r>
-                      <a:endParaRPr lang="en-US" sz="1600">
+                      <a:endParaRPr lang="en-US" sz="1400">
                         <a:latin typeface="Consolas" panose="020B0609020204030204" pitchFamily="49" charset="0"/>
                       </a:endParaRPr>
                     </a:p>
@@ -9410,12 +9410,12 @@
                     <a:lstStyle/>
                     <a:p>
                       <a:r>
-                        <a:rPr lang="de-DE" sz="1600">
+                        <a:rPr lang="de-DE" sz="1400">
                           <a:latin typeface="Consolas" panose="020B0609020204030204" pitchFamily="49" charset="0"/>
                         </a:rPr>
-                        <a:t>chr</a:t>
+                        <a:t>date</a:t>
                       </a:r>
-                      <a:endParaRPr lang="en-US" sz="1600">
+                      <a:endParaRPr lang="en-US" sz="1400">
                         <a:latin typeface="Consolas" panose="020B0609020204030204" pitchFamily="49" charset="0"/>
                       </a:endParaRPr>
                     </a:p>
@@ -9428,33 +9428,33 @@
                     <a:lstStyle/>
                     <a:p>
                       <a:r>
-                        <a:rPr lang="de-DE" sz="1600"/>
-                        <a:t>Tweet text</a:t>
+                        <a:rPr lang="de-DE" sz="1400"/>
+                        <a:t>Time stamp of tweet creation</a:t>
                       </a:r>
-                      <a:endParaRPr lang="en-US" sz="1600"/>
+                      <a:endParaRPr lang="en-US" sz="1400"/>
                     </a:p>
                   </a:txBody>
                   <a:tcPr/>
                 </a:tc>
                 <a:extLst>
                   <a:ext uri="{0D108BD9-81ED-4DB2-BD59-A6C34878D82A}">
-                    <a16:rowId xmlns:a16="http://schemas.microsoft.com/office/drawing/2014/main" val="4291134398"/>
+                    <a16:rowId xmlns:a16="http://schemas.microsoft.com/office/drawing/2014/main" val="3588617551"/>
                   </a:ext>
                 </a:extLst>
               </a:tr>
-              <a:tr h="331573">
+              <a:tr h="259488">
                 <a:tc>
                   <a:txBody>
                     <a:bodyPr/>
                     <a:lstStyle/>
                     <a:p>
                       <a:r>
-                        <a:rPr lang="de-DE" sz="1600">
+                        <a:rPr lang="de-DE" sz="1400">
                           <a:latin typeface="Consolas" panose="020B0609020204030204" pitchFamily="49" charset="0"/>
                         </a:rPr>
-                        <a:t>favorite_count</a:t>
+                        <a:t>text</a:t>
                       </a:r>
-                      <a:endParaRPr lang="en-US" sz="1600">
+                      <a:endParaRPr lang="en-US" sz="1400">
                         <a:latin typeface="Consolas" panose="020B0609020204030204" pitchFamily="49" charset="0"/>
                       </a:endParaRPr>
                     </a:p>
@@ -9467,12 +9467,12 @@
                     <a:lstStyle/>
                     <a:p>
                       <a:r>
-                        <a:rPr lang="de-DE" sz="1600">
+                        <a:rPr lang="de-DE" sz="1400">
                           <a:latin typeface="Consolas" panose="020B0609020204030204" pitchFamily="49" charset="0"/>
                         </a:rPr>
-                        <a:t>num</a:t>
+                        <a:t>chr</a:t>
                       </a:r>
-                      <a:endParaRPr lang="en-US" sz="1600">
+                      <a:endParaRPr lang="en-US" sz="1400">
                         <a:latin typeface="Consolas" panose="020B0609020204030204" pitchFamily="49" charset="0"/>
                       </a:endParaRPr>
                     </a:p>
@@ -9485,33 +9485,33 @@
                     <a:lstStyle/>
                     <a:p>
                       <a:r>
-                        <a:rPr lang="de-DE" sz="1600"/>
-                        <a:t>Number of likes for tweet at scraping time</a:t>
+                        <a:rPr lang="de-DE" sz="1400"/>
+                        <a:t>Tweet text</a:t>
                       </a:r>
-                      <a:endParaRPr lang="en-US" sz="1600"/>
+                      <a:endParaRPr lang="en-US" sz="1400"/>
                     </a:p>
                   </a:txBody>
                   <a:tcPr/>
                 </a:tc>
                 <a:extLst>
                   <a:ext uri="{0D108BD9-81ED-4DB2-BD59-A6C34878D82A}">
-                    <a16:rowId xmlns:a16="http://schemas.microsoft.com/office/drawing/2014/main" val="1227411712"/>
+                    <a16:rowId xmlns:a16="http://schemas.microsoft.com/office/drawing/2014/main" val="4291134398"/>
                   </a:ext>
                 </a:extLst>
               </a:tr>
-              <a:tr h="331573">
+              <a:tr h="259488">
                 <a:tc>
                   <a:txBody>
                     <a:bodyPr/>
                     <a:lstStyle/>
                     <a:p>
                       <a:r>
-                        <a:rPr lang="de-DE" sz="1600">
+                        <a:rPr lang="de-DE" sz="1400">
                           <a:latin typeface="Consolas" panose="020B0609020204030204" pitchFamily="49" charset="0"/>
                         </a:rPr>
-                        <a:t>retweet_count</a:t>
+                        <a:t>favorite_count</a:t>
                       </a:r>
-                      <a:endParaRPr lang="en-US" sz="1600">
+                      <a:endParaRPr lang="en-US" sz="1400">
                         <a:latin typeface="Consolas" panose="020B0609020204030204" pitchFamily="49" charset="0"/>
                       </a:endParaRPr>
                     </a:p>
@@ -9524,12 +9524,12 @@
                     <a:lstStyle/>
                     <a:p>
                       <a:r>
-                        <a:rPr lang="de-DE" sz="1600">
+                        <a:rPr lang="de-DE" sz="1400">
                           <a:latin typeface="Consolas" panose="020B0609020204030204" pitchFamily="49" charset="0"/>
                         </a:rPr>
                         <a:t>num</a:t>
                       </a:r>
-                      <a:endParaRPr lang="en-US" sz="1600">
+                      <a:endParaRPr lang="en-US" sz="1400">
                         <a:latin typeface="Consolas" panose="020B0609020204030204" pitchFamily="49" charset="0"/>
                       </a:endParaRPr>
                     </a:p>
@@ -9542,10 +9542,67 @@
                     <a:lstStyle/>
                     <a:p>
                       <a:r>
-                        <a:rPr lang="de-DE" sz="1600"/>
+                        <a:rPr lang="de-DE" sz="1400"/>
+                        <a:t>Number of likes for tweet at scraping time</a:t>
+                      </a:r>
+                      <a:endParaRPr lang="en-US" sz="1400"/>
+                    </a:p>
+                  </a:txBody>
+                  <a:tcPr/>
+                </a:tc>
+                <a:extLst>
+                  <a:ext uri="{0D108BD9-81ED-4DB2-BD59-A6C34878D82A}">
+                    <a16:rowId xmlns:a16="http://schemas.microsoft.com/office/drawing/2014/main" val="1227411712"/>
+                  </a:ext>
+                </a:extLst>
+              </a:tr>
+              <a:tr h="259488">
+                <a:tc>
+                  <a:txBody>
+                    <a:bodyPr/>
+                    <a:lstStyle/>
+                    <a:p>
+                      <a:r>
+                        <a:rPr lang="de-DE" sz="1400">
+                          <a:latin typeface="Consolas" panose="020B0609020204030204" pitchFamily="49" charset="0"/>
+                        </a:rPr>
+                        <a:t>retweet_count</a:t>
+                      </a:r>
+                      <a:endParaRPr lang="en-US" sz="1400">
+                        <a:latin typeface="Consolas" panose="020B0609020204030204" pitchFamily="49" charset="0"/>
+                      </a:endParaRPr>
+                    </a:p>
+                  </a:txBody>
+                  <a:tcPr/>
+                </a:tc>
+                <a:tc>
+                  <a:txBody>
+                    <a:bodyPr/>
+                    <a:lstStyle/>
+                    <a:p>
+                      <a:r>
+                        <a:rPr lang="de-DE" sz="1400">
+                          <a:latin typeface="Consolas" panose="020B0609020204030204" pitchFamily="49" charset="0"/>
+                        </a:rPr>
+                        <a:t>num</a:t>
+                      </a:r>
+                      <a:endParaRPr lang="en-US" sz="1400">
+                        <a:latin typeface="Consolas" panose="020B0609020204030204" pitchFamily="49" charset="0"/>
+                      </a:endParaRPr>
+                    </a:p>
+                  </a:txBody>
+                  <a:tcPr/>
+                </a:tc>
+                <a:tc>
+                  <a:txBody>
+                    <a:bodyPr/>
+                    <a:lstStyle/>
+                    <a:p>
+                      <a:r>
+                        <a:rPr lang="de-DE" sz="1400"/>
                         <a:t>Number of retweets for tweet at scraping time</a:t>
                       </a:r>
-                      <a:endParaRPr lang="en-US" sz="1600"/>
+                      <a:endParaRPr lang="en-US" sz="1400"/>
                     </a:p>
                   </a:txBody>
                   <a:tcPr/>
@@ -9560,64 +9617,6 @@
           </a:graphicData>
         </a:graphic>
       </p:graphicFrame>
-      <p:sp>
-        <p:nvSpPr>
-          <p:cNvPr id="14" name="Rectangle 13">
-            <a:extLst>
-              <a:ext uri="{FF2B5EF4-FFF2-40B4-BE49-F238E27FC236}">
-                <a16:creationId xmlns:a16="http://schemas.microsoft.com/office/drawing/2014/main" id="{A1E9B64B-A8C4-4243-A57D-C9B363F9293C}"/>
-              </a:ext>
-            </a:extLst>
-          </p:cNvPr>
-          <p:cNvSpPr/>
-          <p:nvPr/>
-        </p:nvSpPr>
-        <p:spPr>
-          <a:xfrm>
-            <a:off x="4827104" y="0"/>
-            <a:ext cx="7364896" cy="914400"/>
-          </a:xfrm>
-          <a:prstGeom prst="rect">
-            <a:avLst/>
-          </a:prstGeom>
-          <a:solidFill>
-            <a:schemeClr val="accent2"/>
-          </a:solidFill>
-          <a:ln>
-            <a:solidFill>
-              <a:schemeClr val="accent2"/>
-            </a:solidFill>
-          </a:ln>
-        </p:spPr>
-        <p:style>
-          <a:lnRef idx="2">
-            <a:schemeClr val="accent1">
-              <a:shade val="50000"/>
-            </a:schemeClr>
-          </a:lnRef>
-          <a:fillRef idx="1">
-            <a:schemeClr val="accent1"/>
-          </a:fillRef>
-          <a:effectRef idx="0">
-            <a:schemeClr val="accent1"/>
-          </a:effectRef>
-          <a:fontRef idx="minor">
-            <a:schemeClr val="lt1"/>
-          </a:fontRef>
-        </p:style>
-        <p:txBody>
-          <a:bodyPr rtlCol="0" anchor="ctr"/>
-          <a:lstStyle/>
-          <a:p>
-            <a:pPr algn="ctr"/>
-            <a:r>
-              <a:rPr lang="de-DE"/>
-              <a:t>ergänzen, wenn toy data final erstellt</a:t>
-            </a:r>
-            <a:endParaRPr lang="en-US"/>
-          </a:p>
-        </p:txBody>
-      </p:sp>
     </p:spTree>
     <p:extLst>
       <p:ext uri="{BB962C8B-B14F-4D97-AF65-F5344CB8AC3E}">
@@ -10306,8 +10305,8 @@
         </p:nvCxnSpPr>
         <p:spPr>
           <a:xfrm>
-            <a:off x="4495801" y="1968868"/>
-            <a:ext cx="0" cy="2903724"/>
+            <a:off x="4495801" y="1989979"/>
+            <a:ext cx="0" cy="2882613"/>
           </a:xfrm>
           <a:prstGeom prst="straightConnector1">
             <a:avLst/>
@@ -10358,7 +10357,7 @@
         </p:blipFill>
         <p:spPr>
           <a:xfrm>
-            <a:off x="1047899" y="4872592"/>
+            <a:off x="1103376" y="4872592"/>
             <a:ext cx="784166" cy="794002"/>
           </a:xfrm>
           <a:prstGeom prst="rect">
@@ -17193,6 +17192,56 @@
               <a:rPr lang="en-US" smtClean="0"/>
               <a:t>35</a:t>
             </a:fld>
+            <a:endParaRPr lang="en-US"/>
+          </a:p>
+        </p:txBody>
+      </p:sp>
+      <p:sp>
+        <p:nvSpPr>
+          <p:cNvPr id="2" name="Rectangle 1">
+            <a:extLst>
+              <a:ext uri="{FF2B5EF4-FFF2-40B4-BE49-F238E27FC236}">
+                <a16:creationId xmlns:a16="http://schemas.microsoft.com/office/drawing/2014/main" id="{894D39AA-D274-4B7F-8596-0A6891FB77A5}"/>
+              </a:ext>
+            </a:extLst>
+          </p:cNvPr>
+          <p:cNvSpPr/>
+          <p:nvPr/>
+        </p:nvSpPr>
+        <p:spPr>
+          <a:xfrm>
+            <a:off x="0" y="1954466"/>
+            <a:ext cx="12192000" cy="3364992"/>
+          </a:xfrm>
+          <a:prstGeom prst="rect">
+            <a:avLst/>
+          </a:prstGeom>
+        </p:spPr>
+        <p:style>
+          <a:lnRef idx="2">
+            <a:schemeClr val="accent2">
+              <a:shade val="50000"/>
+            </a:schemeClr>
+          </a:lnRef>
+          <a:fillRef idx="1">
+            <a:schemeClr val="accent2"/>
+          </a:fillRef>
+          <a:effectRef idx="0">
+            <a:schemeClr val="accent2"/>
+          </a:effectRef>
+          <a:fontRef idx="minor">
+            <a:schemeClr val="lt1"/>
+          </a:fontRef>
+        </p:style>
+        <p:txBody>
+          <a:bodyPr rtlCol="0" anchor="ctr"/>
+          <a:lstStyle/>
+          <a:p>
+            <a:pPr algn="ctr"/>
+            <a:r>
+              <a:rPr lang="de-DE"/>
+              <a:t>under construction</a:t>
+            </a:r>
             <a:endParaRPr lang="en-US"/>
           </a:p>
         </p:txBody>

</xml_diff>